<commit_message>
Added a new part of the presentation (#283)
* Delete Wyjątki - prezentacja.pptx

* Added a part of the presentation
</commit_message>
<xml_diff>
--- a/MarcinKowalski/Wyjątki - prezentacja.pptx
+++ b/MarcinKowalski/Wyjątki - prezentacja.pptx
@@ -136,6 +136,121 @@
 </p:presentation>
 </file>
 
+<file path=ppt/revisionInfo.xml><?xml version="1.0" encoding="utf-8"?>
+<p1510:revInfo xmlns:a="http://schemas.openxmlformats.org/drawingml/2006/main" xmlns:r="http://schemas.openxmlformats.org/officeDocument/2006/relationships" xmlns:p1510="http://schemas.microsoft.com/office/powerpoint/2015/10/main">
+  <p1510:revLst>
+    <p1510:client id="{52B78D96-4DBE-4D50-A71C-C7AA807E2802}" v="14" dt="2022-12-02T17:07:55.518"/>
+  </p1510:revLst>
+</p1510:revInfo>
+</file>
+
+<file path=ppt/changesInfos/changesInfo1.xml><?xml version="1.0" encoding="utf-8"?>
+<pc:chgInfo xmlns:a="http://schemas.openxmlformats.org/drawingml/2006/main" xmlns:r="http://schemas.openxmlformats.org/officeDocument/2006/relationships" xmlns:ac="http://schemas.microsoft.com/office/drawing/2013/main/command" xmlns:pc="http://schemas.microsoft.com/office/powerpoint/2013/main/command">
+  <pc:docChgLst>
+    <pc:chgData name="Marcin Kowalski" userId="178edd39374db964" providerId="LiveId" clId="{52B78D96-4DBE-4D50-A71C-C7AA807E2802}"/>
+    <pc:docChg chg="undo custSel addSld delSld modSld">
+      <pc:chgData name="Marcin Kowalski" userId="178edd39374db964" providerId="LiveId" clId="{52B78D96-4DBE-4D50-A71C-C7AA807E2802}" dt="2022-12-02T17:09:49.707" v="53"/>
+      <pc:docMkLst>
+        <pc:docMk/>
+      </pc:docMkLst>
+      <pc:sldChg chg="addSp delSp modSp mod modClrScheme chgLayout">
+        <pc:chgData name="Marcin Kowalski" userId="178edd39374db964" providerId="LiveId" clId="{52B78D96-4DBE-4D50-A71C-C7AA807E2802}" dt="2022-12-02T17:08:03.565" v="42" actId="1076"/>
+        <pc:sldMkLst>
+          <pc:docMk/>
+          <pc:sldMk cId="3984617762" sldId="257"/>
+        </pc:sldMkLst>
+        <pc:spChg chg="mod">
+          <ac:chgData name="Marcin Kowalski" userId="178edd39374db964" providerId="LiveId" clId="{52B78D96-4DBE-4D50-A71C-C7AA807E2802}" dt="2022-12-02T17:03:39.246" v="33" actId="26606"/>
+          <ac:spMkLst>
+            <pc:docMk/>
+            <pc:sldMk cId="3984617762" sldId="257"/>
+            <ac:spMk id="2" creationId="{00000000-0000-0000-0000-000000000000}"/>
+          </ac:spMkLst>
+        </pc:spChg>
+        <pc:spChg chg="mod ord">
+          <ac:chgData name="Marcin Kowalski" userId="178edd39374db964" providerId="LiveId" clId="{52B78D96-4DBE-4D50-A71C-C7AA807E2802}" dt="2022-12-02T17:03:39.246" v="33" actId="26606"/>
+          <ac:spMkLst>
+            <pc:docMk/>
+            <pc:sldMk cId="3984617762" sldId="257"/>
+            <ac:spMk id="3" creationId="{00000000-0000-0000-0000-000000000000}"/>
+          </ac:spMkLst>
+        </pc:spChg>
+        <pc:spChg chg="add del mod">
+          <ac:chgData name="Marcin Kowalski" userId="178edd39374db964" providerId="LiveId" clId="{52B78D96-4DBE-4D50-A71C-C7AA807E2802}" dt="2022-12-02T17:03:39.243" v="32" actId="26606"/>
+          <ac:spMkLst>
+            <pc:docMk/>
+            <pc:sldMk cId="3984617762" sldId="257"/>
+            <ac:spMk id="1031" creationId="{55990942-F63D-EB61-3072-85D5CA262540}"/>
+          </ac:spMkLst>
+        </pc:spChg>
+        <pc:spChg chg="add del mod">
+          <ac:chgData name="Marcin Kowalski" userId="178edd39374db964" providerId="LiveId" clId="{52B78D96-4DBE-4D50-A71C-C7AA807E2802}" dt="2022-12-02T17:03:39.243" v="32" actId="26606"/>
+          <ac:spMkLst>
+            <pc:docMk/>
+            <pc:sldMk cId="3984617762" sldId="257"/>
+            <ac:spMk id="1033" creationId="{8BE75F80-4B7A-CAEE-2B05-FF9FE53FF229}"/>
+          </ac:spMkLst>
+        </pc:spChg>
+        <pc:graphicFrameChg chg="add mod">
+          <ac:chgData name="Marcin Kowalski" userId="178edd39374db964" providerId="LiveId" clId="{52B78D96-4DBE-4D50-A71C-C7AA807E2802}" dt="2022-12-02T17:08:03.565" v="42" actId="1076"/>
+          <ac:graphicFrameMkLst>
+            <pc:docMk/>
+            <pc:sldMk cId="3984617762" sldId="257"/>
+            <ac:graphicFrameMk id="4" creationId="{A0595980-7B00-D9B2-4F74-4462F172DB12}"/>
+          </ac:graphicFrameMkLst>
+        </pc:graphicFrameChg>
+        <pc:picChg chg="add del mod">
+          <ac:chgData name="Marcin Kowalski" userId="178edd39374db964" providerId="LiveId" clId="{52B78D96-4DBE-4D50-A71C-C7AA807E2802}" dt="2022-12-02T17:04:23.404" v="35" actId="478"/>
+          <ac:picMkLst>
+            <pc:docMk/>
+            <pc:sldMk cId="3984617762" sldId="257"/>
+            <ac:picMk id="1026" creationId="{D8164DF2-F391-E9DA-3EFE-019D16D5C582}"/>
+          </ac:picMkLst>
+        </pc:picChg>
+        <pc:picChg chg="add del mod">
+          <ac:chgData name="Marcin Kowalski" userId="178edd39374db964" providerId="LiveId" clId="{52B78D96-4DBE-4D50-A71C-C7AA807E2802}" dt="2022-12-02T17:07:55.017" v="39" actId="478"/>
+          <ac:picMkLst>
+            <pc:docMk/>
+            <pc:sldMk cId="3984617762" sldId="257"/>
+            <ac:picMk id="1028" creationId="{21FB8D24-CAE4-F563-E2FD-3F15151D8A50}"/>
+          </ac:picMkLst>
+        </pc:picChg>
+      </pc:sldChg>
+      <pc:sldChg chg="modSp mod">
+        <pc:chgData name="Marcin Kowalski" userId="178edd39374db964" providerId="LiveId" clId="{52B78D96-4DBE-4D50-A71C-C7AA807E2802}" dt="2022-12-02T17:09:49.707" v="53"/>
+        <pc:sldMkLst>
+          <pc:docMk/>
+          <pc:sldMk cId="1476019738" sldId="262"/>
+        </pc:sldMkLst>
+        <pc:spChg chg="mod">
+          <ac:chgData name="Marcin Kowalski" userId="178edd39374db964" providerId="LiveId" clId="{52B78D96-4DBE-4D50-A71C-C7AA807E2802}" dt="2022-12-02T17:09:49.707" v="53"/>
+          <ac:spMkLst>
+            <pc:docMk/>
+            <pc:sldMk cId="1476019738" sldId="262"/>
+            <ac:spMk id="4" creationId="{AC87FB59-F3BA-7EA6-2198-F301B91978E4}"/>
+          </ac:spMkLst>
+        </pc:spChg>
+      </pc:sldChg>
+      <pc:sldChg chg="modSp add del mod">
+        <pc:chgData name="Marcin Kowalski" userId="178edd39374db964" providerId="LiveId" clId="{52B78D96-4DBE-4D50-A71C-C7AA807E2802}" dt="2022-12-02T17:08:35.012" v="43" actId="47"/>
+        <pc:sldMkLst>
+          <pc:docMk/>
+          <pc:sldMk cId="1168163949" sldId="265"/>
+        </pc:sldMkLst>
+        <pc:spChg chg="mod">
+          <ac:chgData name="Marcin Kowalski" userId="178edd39374db964" providerId="LiveId" clId="{52B78D96-4DBE-4D50-A71C-C7AA807E2802}" dt="2022-12-02T15:50:55.496" v="12" actId="20577"/>
+          <ac:spMkLst>
+            <pc:docMk/>
+            <pc:sldMk cId="1168163949" sldId="265"/>
+            <ac:spMk id="2" creationId="{00000000-0000-0000-0000-000000000000}"/>
+          </ac:spMkLst>
+        </pc:spChg>
+      </pc:sldChg>
+    </pc:docChg>
+  </pc:docChgLst>
+</pc:chgInfo>
+</file>
+
 <file path=ppt/handoutMasters/handoutMaster1.xml><?xml version="1.0" encoding="utf-8"?>
 <p:handoutMaster xmlns:a="http://schemas.openxmlformats.org/drawingml/2006/main" xmlns:r="http://schemas.openxmlformats.org/officeDocument/2006/relationships" xmlns:p="http://schemas.openxmlformats.org/presentationml/2006/main">
   <p:cSld>
@@ -220,7 +335,7 @@
             <a:pPr rtl="0"/>
             <a:fld id="{11F6B162-B019-4558-B36F-3F7010E42FDF}" type="datetime1">
               <a:rPr lang="pl-PL" smtClean="0"/>
-              <a:t>25.11.2022</a:t>
+              <a:t>02.12.2022</a:t>
             </a:fld>
             <a:endParaRPr lang="pl-PL" dirty="0"/>
           </a:p>
@@ -389,7 +504,7 @@
             <a:fld id="{F8FD5293-0EA9-4B42-A238-C80836CA7D9E}" type="datetime1">
               <a:rPr lang="pl-PL" smtClean="0"/>
               <a:pPr/>
-              <a:t>25.11.2022</a:t>
+              <a:t>02.12.2022</a:t>
             </a:fld>
             <a:endParaRPr lang="pl-PL" dirty="0"/>
           </a:p>
@@ -3070,7 +3185,7 @@
             <a:fld id="{70E306AB-97F8-4E2E-BF87-8C3481B5FBD8}" type="datetime1">
               <a:rPr lang="pl-PL" smtClean="0"/>
               <a:pPr/>
-              <a:t>25.11.2022</a:t>
+              <a:t>02.12.2022</a:t>
             </a:fld>
             <a:endParaRPr lang="pl-PL" dirty="0"/>
           </a:p>
@@ -3276,7 +3391,7 @@
             <a:fld id="{54F57989-D074-470C-8B53-0A83600092FA}" type="datetime1">
               <a:rPr lang="pl-PL" smtClean="0"/>
               <a:pPr/>
-              <a:t>25.11.2022</a:t>
+              <a:t>02.12.2022</a:t>
             </a:fld>
             <a:endParaRPr lang="pl-PL" dirty="0"/>
           </a:p>
@@ -3472,7 +3587,7 @@
             <a:fld id="{513EF585-5FBB-4299-9362-D527BD2675CD}" type="datetime1">
               <a:rPr lang="pl-PL" smtClean="0"/>
               <a:pPr/>
-              <a:t>25.11.2022</a:t>
+              <a:t>02.12.2022</a:t>
             </a:fld>
             <a:endParaRPr lang="pl-PL" dirty="0"/>
           </a:p>
@@ -5822,7 +5937,7 @@
             <a:fld id="{9D0E908B-D51D-4142-A5CB-EE5D4309B568}" type="datetime1">
               <a:rPr lang="pl-PL" smtClean="0"/>
               <a:pPr/>
-              <a:t>25.11.2022</a:t>
+              <a:t>02.12.2022</a:t>
             </a:fld>
             <a:endParaRPr lang="pl-PL" dirty="0"/>
           </a:p>
@@ -6284,7 +6399,7 @@
             <a:fld id="{4CB382C9-380C-424E-AF82-A6E8CC1E028B}" type="datetime1">
               <a:rPr lang="pl-PL" smtClean="0"/>
               <a:pPr/>
-              <a:t>25.11.2022</a:t>
+              <a:t>02.12.2022</a:t>
             </a:fld>
             <a:endParaRPr lang="pl-PL" dirty="0"/>
           </a:p>
@@ -6424,7 +6539,7 @@
             <a:fld id="{9B9CB9CC-4696-4285-BA6C-9DFABDF44C2A}" type="datetime1">
               <a:rPr lang="pl-PL" smtClean="0"/>
               <a:pPr/>
-              <a:t>25.11.2022</a:t>
+              <a:t>02.12.2022</a:t>
             </a:fld>
             <a:endParaRPr lang="pl-PL" dirty="0"/>
           </a:p>
@@ -8364,7 +8479,7 @@
             <a:fld id="{DF0DF4F9-CFFF-4A1E-866B-3C5280452CB1}" type="datetime1">
               <a:rPr lang="pl-PL" smtClean="0"/>
               <a:pPr/>
-              <a:t>25.11.2022</a:t>
+              <a:t>02.12.2022</a:t>
             </a:fld>
             <a:endParaRPr lang="pl-PL" dirty="0"/>
           </a:p>
@@ -10625,7 +10740,7 @@
             <a:fld id="{BCE2E449-FA09-4791-AF38-A83448FE51DA}" type="datetime1">
               <a:rPr lang="pl-PL" smtClean="0"/>
               <a:pPr/>
-              <a:t>25.11.2022</a:t>
+              <a:t>02.12.2022</a:t>
             </a:fld>
             <a:endParaRPr lang="pl-PL" dirty="0"/>
           </a:p>
@@ -14923,7 +15038,7 @@
             <a:fld id="{7465ED12-3D75-43E0-9D6D-9FB5D68B824D}" type="datetime1">
               <a:rPr lang="pl-PL" smtClean="0"/>
               <a:pPr/>
-              <a:t>25.11.2022</a:t>
+              <a:t>02.12.2022</a:t>
             </a:fld>
             <a:endParaRPr lang="pl-PL" dirty="0"/>
           </a:p>
@@ -15477,9 +15592,16 @@
             <p:ph type="title"/>
           </p:nvPr>
         </p:nvSpPr>
-        <p:spPr/>
+        <p:spPr>
+          <a:xfrm>
+            <a:off x="1295400" y="503853"/>
+            <a:ext cx="9601200" cy="1142385"/>
+          </a:xfrm>
+        </p:spPr>
         <p:txBody>
-          <a:bodyPr rtlCol="0"/>
+          <a:bodyPr rtlCol="0" anchor="b">
+            <a:normAutofit/>
+          </a:bodyPr>
           <a:lstStyle/>
           <a:p>
             <a:pPr rtl="0"/>
@@ -15497,26 +15619,106 @@
             <a:spLocks noGrp="1"/>
           </p:cNvSpPr>
           <p:nvPr>
-            <p:ph idx="1"/>
+            <p:ph sz="half" idx="2"/>
           </p:nvPr>
         </p:nvSpPr>
-        <p:spPr/>
+        <p:spPr>
+          <a:xfrm>
+            <a:off x="6324600" y="1981199"/>
+            <a:ext cx="4572000" cy="3810001"/>
+          </a:xfrm>
+        </p:spPr>
         <p:txBody>
-          <a:bodyPr rtlCol="0"/>
+          <a:bodyPr rtlCol="0">
+            <a:normAutofit/>
+          </a:bodyPr>
           <a:lstStyle/>
           <a:p>
             <a:pPr rtl="0"/>
             <a:r>
               <a:rPr lang="pl-PL" dirty="0"/>
-              <a:t>Definicja</a:t>
+              <a:t>Wyjątki </a:t>
             </a:r>
-          </a:p>
-          <a:p>
-            <a:pPr rtl="0"/>
-            <a:endParaRPr lang="pl-PL" dirty="0"/>
+            <a:r>
+              <a:rPr lang="pl-PL" u="sng" dirty="0"/>
+              <a:t>pozwalają zachować kontrolę </a:t>
+            </a:r>
+            <a:r>
+              <a:rPr lang="pl-PL" dirty="0"/>
+              <a:t>nad przebiegiem wykonania funkcji (metod), a także pojedynczych instrukcji zawartych w funkcjach. Wyjątek jest zdarzeniem, które pojawia się podczas wykonania i rozrywa normalną kolejność wykonania instrukcji.</a:t>
+            </a:r>
           </a:p>
         </p:txBody>
       </p:sp>
+      <p:graphicFrame>
+        <p:nvGraphicFramePr>
+          <p:cNvPr id="4" name="Obiekt 3">
+            <a:extLst>
+              <a:ext uri="{FF2B5EF4-FFF2-40B4-BE49-F238E27FC236}">
+                <a16:creationId xmlns:a16="http://schemas.microsoft.com/office/drawing/2014/main" id="{A0595980-7B00-D9B2-4F74-4462F172DB12}"/>
+              </a:ext>
+            </a:extLst>
+          </p:cNvPr>
+          <p:cNvGraphicFramePr>
+            <a:graphicFrameLocks noChangeAspect="1"/>
+          </p:cNvGraphicFramePr>
+          <p:nvPr>
+            <p:extLst>
+              <p:ext uri="{D42A27DB-BD31-4B8C-83A1-F6EECF244321}">
+                <p14:modId xmlns:p14="http://schemas.microsoft.com/office/powerpoint/2010/main" val="3634370588"/>
+              </p:ext>
+            </p:extLst>
+          </p:nvPr>
+        </p:nvGraphicFramePr>
+        <p:xfrm>
+          <a:off x="2016733" y="2112456"/>
+          <a:ext cx="2728913" cy="2125663"/>
+        </p:xfrm>
+        <a:graphic>
+          <a:graphicData uri="http://schemas.openxmlformats.org/presentationml/2006/ole">
+            <mc:AlternateContent xmlns:mc="http://schemas.openxmlformats.org/markup-compatibility/2006">
+              <mc:Choice xmlns:v="urn:schemas-microsoft-com:vml" Requires="v">
+                <p:oleObj name="CorelDRAW" r:id="rId3" imgW="2728314" imgH="2125697" progId="CorelDraw.Graphic.23">
+                  <p:embed/>
+                </p:oleObj>
+              </mc:Choice>
+              <mc:Fallback>
+                <p:oleObj name="CorelDRAW" r:id="rId3" imgW="2728314" imgH="2125697" progId="CorelDraw.Graphic.23">
+                  <p:embed/>
+                  <p:pic>
+                    <p:nvPicPr>
+                      <p:cNvPr id="4" name="Obiekt 3">
+                        <a:extLst>
+                          <a:ext uri="{FF2B5EF4-FFF2-40B4-BE49-F238E27FC236}">
+                            <a16:creationId xmlns:a16="http://schemas.microsoft.com/office/drawing/2014/main" id="{A0595980-7B00-D9B2-4F74-4462F172DB12}"/>
+                          </a:ext>
+                        </a:extLst>
+                      </p:cNvPr>
+                      <p:cNvPicPr/>
+                      <p:nvPr/>
+                    </p:nvPicPr>
+                    <p:blipFill>
+                      <a:blip r:embed="rId4"/>
+                      <a:stretch>
+                        <a:fillRect/>
+                      </a:stretch>
+                    </p:blipFill>
+                    <p:spPr>
+                      <a:xfrm>
+                        <a:off x="2016733" y="2112456"/>
+                        <a:ext cx="2728913" cy="2125663"/>
+                      </a:xfrm>
+                      <a:prstGeom prst="rect">
+                        <a:avLst/>
+                      </a:prstGeom>
+                    </p:spPr>
+                  </p:pic>
+                </p:oleObj>
+              </mc:Fallback>
+            </mc:AlternateContent>
+          </a:graphicData>
+        </a:graphic>
+      </p:graphicFrame>
     </p:spTree>
     <p:extLst>
       <p:ext uri="{BB962C8B-B14F-4D97-AF65-F5344CB8AC3E}">
@@ -15605,8 +15807,50 @@
           <a:p>
             <a:r>
               <a:rPr lang="pl-PL" dirty="0"/>
-              <a:t>Tekst…</a:t>
+              <a:t>Wyjątki są wyrzucane i propagowane tak długo jak długo pozostają nie przechwycone w </a:t>
             </a:r>
+            <a:r>
+              <a:rPr lang="pl-PL" dirty="0" err="1"/>
+              <a:t>kodzieprogramu</a:t>
+            </a:r>
+            <a:r>
+              <a:rPr lang="pl-PL" dirty="0"/>
+              <a:t>. Wyjątki nie przechwycone propagują się aż do metody </a:t>
+            </a:r>
+            <a:r>
+              <a:rPr lang="pl-PL" dirty="0" err="1"/>
+              <a:t>main</a:t>
+            </a:r>
+            <a:r>
+              <a:rPr lang="pl-PL" dirty="0"/>
+              <a:t>(...) i jeśli także tam nie </a:t>
+            </a:r>
+            <a:r>
+              <a:rPr lang="pl-PL" dirty="0" err="1"/>
+              <a:t>sąprzechwycone</a:t>
+            </a:r>
+            <a:r>
+              <a:rPr lang="pl-PL" dirty="0"/>
+              <a:t> powodują przerwanie wykonania programu.</a:t>
+            </a:r>
+          </a:p>
+          <a:p>
+            <a:endParaRPr lang="pl-PL" dirty="0"/>
+          </a:p>
+          <a:p>
+            <a:r>
+              <a:rPr lang="pl-PL" dirty="0"/>
+              <a:t>W celu przechwycenia i obsłużenia wyjątków w języku Java korzysta się z </a:t>
+            </a:r>
+            <a:r>
+              <a:rPr lang="pl-PL" dirty="0" err="1"/>
+              <a:t>blokutry-catch-finally</a:t>
+            </a:r>
+            <a:r>
+              <a:rPr lang="pl-PL"/>
+              <a:t>.</a:t>
+            </a:r>
+            <a:endParaRPr lang="pl-PL" dirty="0"/>
           </a:p>
         </p:txBody>
       </p:sp>

</xml_diff>

<commit_message>
Add ready presentation (#300)
* Delete Wyjątki - prezentacja.pptx

* Add presentation - final version
</commit_message>
<xml_diff>
--- a/MarcinKowalski/Wyjątki - prezentacja.pptx
+++ b/MarcinKowalski/Wyjątki - prezentacja.pptx
@@ -5,17 +5,21 @@
     <p:sldMasterId id="2147483648" r:id="rId1"/>
   </p:sldMasterIdLst>
   <p:notesMasterIdLst>
-    <p:notesMasterId r:id="rId7"/>
+    <p:notesMasterId r:id="rId11"/>
   </p:notesMasterIdLst>
   <p:handoutMasterIdLst>
-    <p:handoutMasterId r:id="rId8"/>
+    <p:handoutMasterId r:id="rId12"/>
   </p:handoutMasterIdLst>
   <p:sldIdLst>
     <p:sldId id="261" r:id="rId2"/>
     <p:sldId id="257" r:id="rId3"/>
-    <p:sldId id="262" r:id="rId4"/>
-    <p:sldId id="263" r:id="rId5"/>
-    <p:sldId id="264" r:id="rId6"/>
+    <p:sldId id="265" r:id="rId4"/>
+    <p:sldId id="268" r:id="rId5"/>
+    <p:sldId id="269" r:id="rId6"/>
+    <p:sldId id="267" r:id="rId7"/>
+    <p:sldId id="270" r:id="rId8"/>
+    <p:sldId id="266" r:id="rId9"/>
+    <p:sldId id="264" r:id="rId10"/>
   </p:sldIdLst>
   <p:sldSz cx="12192000" cy="6858000"/>
   <p:notesSz cx="6858000" cy="9144000"/>
@@ -136,16 +140,336 @@
 </p:presentation>
 </file>
 
-<file path=ppt/revisionInfo.xml><?xml version="1.0" encoding="utf-8"?>
-<p1510:revInfo xmlns:a="http://schemas.openxmlformats.org/drawingml/2006/main" xmlns:r="http://schemas.openxmlformats.org/officeDocument/2006/relationships" xmlns:p1510="http://schemas.microsoft.com/office/powerpoint/2015/10/main">
-  <p1510:revLst>
-    <p1510:client id="{52B78D96-4DBE-4D50-A71C-C7AA807E2802}" v="14" dt="2022-12-02T17:07:55.518"/>
-  </p1510:revLst>
-</p1510:revInfo>
-</file>
-
 <file path=ppt/changesInfos/changesInfo1.xml><?xml version="1.0" encoding="utf-8"?>
 <pc:chgInfo xmlns:a="http://schemas.openxmlformats.org/drawingml/2006/main" xmlns:r="http://schemas.openxmlformats.org/officeDocument/2006/relationships" xmlns:ac="http://schemas.microsoft.com/office/drawing/2013/main/command" xmlns:pc="http://schemas.microsoft.com/office/powerpoint/2013/main/command">
+  <pc:docChgLst>
+    <pc:chgData name="Marcin Kowalski" userId="178edd39374db964" providerId="LiveId" clId="{E2CE7F14-F837-4086-B4C6-456164CFFF15}"/>
+    <pc:docChg chg="undo custSel addSld delSld modSld sldOrd">
+      <pc:chgData name="Marcin Kowalski" userId="178edd39374db964" providerId="LiveId" clId="{E2CE7F14-F837-4086-B4C6-456164CFFF15}" dt="2022-12-09T13:24:13.119" v="480" actId="20577"/>
+      <pc:docMkLst>
+        <pc:docMk/>
+      </pc:docMkLst>
+      <pc:sldChg chg="modSp mod ord">
+        <pc:chgData name="Marcin Kowalski" userId="178edd39374db964" providerId="LiveId" clId="{E2CE7F14-F837-4086-B4C6-456164CFFF15}" dt="2022-12-09T13:24:01.356" v="478" actId="20577"/>
+        <pc:sldMkLst>
+          <pc:docMk/>
+          <pc:sldMk cId="3984617762" sldId="257"/>
+        </pc:sldMkLst>
+        <pc:spChg chg="mod">
+          <ac:chgData name="Marcin Kowalski" userId="178edd39374db964" providerId="LiveId" clId="{E2CE7F14-F837-4086-B4C6-456164CFFF15}" dt="2022-12-08T22:52:54.983" v="298" actId="20577"/>
+          <ac:spMkLst>
+            <pc:docMk/>
+            <pc:sldMk cId="3984617762" sldId="257"/>
+            <ac:spMk id="2" creationId="{00000000-0000-0000-0000-000000000000}"/>
+          </ac:spMkLst>
+        </pc:spChg>
+        <pc:spChg chg="mod">
+          <ac:chgData name="Marcin Kowalski" userId="178edd39374db964" providerId="LiveId" clId="{E2CE7F14-F837-4086-B4C6-456164CFFF15}" dt="2022-12-09T13:24:01.356" v="478" actId="20577"/>
+          <ac:spMkLst>
+            <pc:docMk/>
+            <pc:sldMk cId="3984617762" sldId="257"/>
+            <ac:spMk id="3" creationId="{00000000-0000-0000-0000-000000000000}"/>
+          </ac:spMkLst>
+        </pc:spChg>
+      </pc:sldChg>
+      <pc:sldChg chg="modSp del mod">
+        <pc:chgData name="Marcin Kowalski" userId="178edd39374db964" providerId="LiveId" clId="{E2CE7F14-F837-4086-B4C6-456164CFFF15}" dt="2022-12-09T12:24:28.240" v="447" actId="47"/>
+        <pc:sldMkLst>
+          <pc:docMk/>
+          <pc:sldMk cId="1476019738" sldId="262"/>
+        </pc:sldMkLst>
+        <pc:spChg chg="mod">
+          <ac:chgData name="Marcin Kowalski" userId="178edd39374db964" providerId="LiveId" clId="{E2CE7F14-F837-4086-B4C6-456164CFFF15}" dt="2022-12-08T22:43:32.550" v="203" actId="20577"/>
+          <ac:spMkLst>
+            <pc:docMk/>
+            <pc:sldMk cId="1476019738" sldId="262"/>
+            <ac:spMk id="4" creationId="{AC87FB59-F3BA-7EA6-2198-F301B91978E4}"/>
+          </ac:spMkLst>
+        </pc:spChg>
+      </pc:sldChg>
+      <pc:sldChg chg="delSp modSp del mod">
+        <pc:chgData name="Marcin Kowalski" userId="178edd39374db964" providerId="LiveId" clId="{E2CE7F14-F837-4086-B4C6-456164CFFF15}" dt="2022-12-08T22:41:59.721" v="201" actId="47"/>
+        <pc:sldMkLst>
+          <pc:docMk/>
+          <pc:sldMk cId="4112112865" sldId="263"/>
+        </pc:sldMkLst>
+        <pc:spChg chg="mod">
+          <ac:chgData name="Marcin Kowalski" userId="178edd39374db964" providerId="LiveId" clId="{E2CE7F14-F837-4086-B4C6-456164CFFF15}" dt="2022-12-08T22:41:48.464" v="200" actId="1076"/>
+          <ac:spMkLst>
+            <pc:docMk/>
+            <pc:sldMk cId="4112112865" sldId="263"/>
+            <ac:spMk id="2" creationId="{8E392867-9C00-633E-7D5F-A09E879E6066}"/>
+          </ac:spMkLst>
+        </pc:spChg>
+        <pc:spChg chg="del">
+          <ac:chgData name="Marcin Kowalski" userId="178edd39374db964" providerId="LiveId" clId="{E2CE7F14-F837-4086-B4C6-456164CFFF15}" dt="2022-12-08T22:41:44.766" v="199" actId="478"/>
+          <ac:spMkLst>
+            <pc:docMk/>
+            <pc:sldMk cId="4112112865" sldId="263"/>
+            <ac:spMk id="3" creationId="{91714D40-D172-98F4-8F5D-ED58B56114A4}"/>
+          </ac:spMkLst>
+        </pc:spChg>
+      </pc:sldChg>
+      <pc:sldChg chg="modSp new mod ord">
+        <pc:chgData name="Marcin Kowalski" userId="178edd39374db964" providerId="LiveId" clId="{E2CE7F14-F837-4086-B4C6-456164CFFF15}" dt="2022-12-09T13:24:13.119" v="480" actId="20577"/>
+        <pc:sldMkLst>
+          <pc:docMk/>
+          <pc:sldMk cId="229441118" sldId="265"/>
+        </pc:sldMkLst>
+        <pc:spChg chg="mod">
+          <ac:chgData name="Marcin Kowalski" userId="178edd39374db964" providerId="LiveId" clId="{E2CE7F14-F837-4086-B4C6-456164CFFF15}" dt="2022-12-08T21:39:38.840" v="27" actId="20577"/>
+          <ac:spMkLst>
+            <pc:docMk/>
+            <pc:sldMk cId="229441118" sldId="265"/>
+            <ac:spMk id="2" creationId="{274A7E54-0D53-6E87-EFAD-4343C3D4CC51}"/>
+          </ac:spMkLst>
+        </pc:spChg>
+        <pc:spChg chg="mod">
+          <ac:chgData name="Marcin Kowalski" userId="178edd39374db964" providerId="LiveId" clId="{E2CE7F14-F837-4086-B4C6-456164CFFF15}" dt="2022-12-09T13:24:13.119" v="480" actId="20577"/>
+          <ac:spMkLst>
+            <pc:docMk/>
+            <pc:sldMk cId="229441118" sldId="265"/>
+            <ac:spMk id="3" creationId="{630E54FB-D404-1A4A-6392-1D9EF622CA77}"/>
+          </ac:spMkLst>
+        </pc:spChg>
+      </pc:sldChg>
+      <pc:sldChg chg="modSp new mod">
+        <pc:chgData name="Marcin Kowalski" userId="178edd39374db964" providerId="LiveId" clId="{E2CE7F14-F837-4086-B4C6-456164CFFF15}" dt="2022-12-08T22:40:38.698" v="188"/>
+        <pc:sldMkLst>
+          <pc:docMk/>
+          <pc:sldMk cId="4127743925" sldId="266"/>
+        </pc:sldMkLst>
+        <pc:spChg chg="mod">
+          <ac:chgData name="Marcin Kowalski" userId="178edd39374db964" providerId="LiveId" clId="{E2CE7F14-F837-4086-B4C6-456164CFFF15}" dt="2022-12-08T22:40:06.768" v="179" actId="20577"/>
+          <ac:spMkLst>
+            <pc:docMk/>
+            <pc:sldMk cId="4127743925" sldId="266"/>
+            <ac:spMk id="2" creationId="{EEC63AE0-9878-68AE-6339-ED3116DB4105}"/>
+          </ac:spMkLst>
+        </pc:spChg>
+        <pc:spChg chg="mod">
+          <ac:chgData name="Marcin Kowalski" userId="178edd39374db964" providerId="LiveId" clId="{E2CE7F14-F837-4086-B4C6-456164CFFF15}" dt="2022-12-08T22:40:38.698" v="188"/>
+          <ac:spMkLst>
+            <pc:docMk/>
+            <pc:sldMk cId="4127743925" sldId="266"/>
+            <ac:spMk id="3" creationId="{52CEE514-82D1-5E99-1315-9E2E1FD38048}"/>
+          </ac:spMkLst>
+        </pc:spChg>
+      </pc:sldChg>
+      <pc:sldChg chg="addSp delSp modSp new mod">
+        <pc:chgData name="Marcin Kowalski" userId="178edd39374db964" providerId="LiveId" clId="{E2CE7F14-F837-4086-B4C6-456164CFFF15}" dt="2022-12-09T12:23:16.285" v="439" actId="1076"/>
+        <pc:sldMkLst>
+          <pc:docMk/>
+          <pc:sldMk cId="1062117154" sldId="267"/>
+        </pc:sldMkLst>
+        <pc:spChg chg="mod">
+          <ac:chgData name="Marcin Kowalski" userId="178edd39374db964" providerId="LiveId" clId="{E2CE7F14-F837-4086-B4C6-456164CFFF15}" dt="2022-12-09T12:23:16.285" v="439" actId="1076"/>
+          <ac:spMkLst>
+            <pc:docMk/>
+            <pc:sldMk cId="1062117154" sldId="267"/>
+            <ac:spMk id="2" creationId="{364FB505-6974-4722-7F1B-24E5EE81E408}"/>
+          </ac:spMkLst>
+        </pc:spChg>
+        <pc:spChg chg="del">
+          <ac:chgData name="Marcin Kowalski" userId="178edd39374db964" providerId="LiveId" clId="{E2CE7F14-F837-4086-B4C6-456164CFFF15}" dt="2022-12-09T12:17:11.999" v="427" actId="478"/>
+          <ac:spMkLst>
+            <pc:docMk/>
+            <pc:sldMk cId="1062117154" sldId="267"/>
+            <ac:spMk id="3" creationId="{5D4E1399-3DFC-0344-1191-B36D72CCADA9}"/>
+          </ac:spMkLst>
+        </pc:spChg>
+        <pc:picChg chg="add del mod">
+          <ac:chgData name="Marcin Kowalski" userId="178edd39374db964" providerId="LiveId" clId="{E2CE7F14-F837-4086-B4C6-456164CFFF15}" dt="2022-12-09T12:22:43.102" v="434" actId="478"/>
+          <ac:picMkLst>
+            <pc:docMk/>
+            <pc:sldMk cId="1062117154" sldId="267"/>
+            <ac:picMk id="5" creationId="{EC8A2019-3201-D515-69F6-B260710F6C06}"/>
+          </ac:picMkLst>
+        </pc:picChg>
+        <pc:picChg chg="add mod">
+          <ac:chgData name="Marcin Kowalski" userId="178edd39374db964" providerId="LiveId" clId="{E2CE7F14-F837-4086-B4C6-456164CFFF15}" dt="2022-12-09T12:23:09.144" v="438" actId="14100"/>
+          <ac:picMkLst>
+            <pc:docMk/>
+            <pc:sldMk cId="1062117154" sldId="267"/>
+            <ac:picMk id="7" creationId="{EE263A22-A02D-DC45-043B-5579AC04185E}"/>
+          </ac:picMkLst>
+        </pc:picChg>
+      </pc:sldChg>
+      <pc:sldChg chg="addSp delSp modSp new mod ord">
+        <pc:chgData name="Marcin Kowalski" userId="178edd39374db964" providerId="LiveId" clId="{E2CE7F14-F837-4086-B4C6-456164CFFF15}" dt="2022-12-09T12:38:25.965" v="453"/>
+        <pc:sldMkLst>
+          <pc:docMk/>
+          <pc:sldMk cId="1034767516" sldId="268"/>
+        </pc:sldMkLst>
+        <pc:spChg chg="mod">
+          <ac:chgData name="Marcin Kowalski" userId="178edd39374db964" providerId="LiveId" clId="{E2CE7F14-F837-4086-B4C6-456164CFFF15}" dt="2022-12-08T23:11:55.072" v="400" actId="20577"/>
+          <ac:spMkLst>
+            <pc:docMk/>
+            <pc:sldMk cId="1034767516" sldId="268"/>
+            <ac:spMk id="2" creationId="{1C0016D6-F732-BB78-6C80-217BC0967AA3}"/>
+          </ac:spMkLst>
+        </pc:spChg>
+        <pc:spChg chg="del">
+          <ac:chgData name="Marcin Kowalski" userId="178edd39374db964" providerId="LiveId" clId="{E2CE7F14-F837-4086-B4C6-456164CFFF15}" dt="2022-12-08T22:58:21.868" v="301" actId="22"/>
+          <ac:spMkLst>
+            <pc:docMk/>
+            <pc:sldMk cId="1034767516" sldId="268"/>
+            <ac:spMk id="3" creationId="{09E6C06D-D228-5695-4183-B038C3AAE370}"/>
+          </ac:spMkLst>
+        </pc:spChg>
+        <pc:spChg chg="add del">
+          <ac:chgData name="Marcin Kowalski" userId="178edd39374db964" providerId="LiveId" clId="{E2CE7F14-F837-4086-B4C6-456164CFFF15}" dt="2022-12-08T22:59:23.960" v="318" actId="478"/>
+          <ac:spMkLst>
+            <pc:docMk/>
+            <pc:sldMk cId="1034767516" sldId="268"/>
+            <ac:spMk id="4" creationId="{53B6C17C-0C2E-AAE4-4E6A-6A46E49AF4D5}"/>
+          </ac:spMkLst>
+        </pc:spChg>
+        <pc:spChg chg="add del mod">
+          <ac:chgData name="Marcin Kowalski" userId="178edd39374db964" providerId="LiveId" clId="{E2CE7F14-F837-4086-B4C6-456164CFFF15}" dt="2022-12-08T23:01:30.459" v="331" actId="478"/>
+          <ac:spMkLst>
+            <pc:docMk/>
+            <pc:sldMk cId="1034767516" sldId="268"/>
+            <ac:spMk id="14" creationId="{B76926DF-79B4-3A72-221C-884F9C5DD303}"/>
+          </ac:spMkLst>
+        </pc:spChg>
+        <pc:picChg chg="add del mod ord">
+          <ac:chgData name="Marcin Kowalski" userId="178edd39374db964" providerId="LiveId" clId="{E2CE7F14-F837-4086-B4C6-456164CFFF15}" dt="2022-12-08T23:01:19.236" v="326" actId="478"/>
+          <ac:picMkLst>
+            <pc:docMk/>
+            <pc:sldMk cId="1034767516" sldId="268"/>
+            <ac:picMk id="6" creationId="{1F87B9E4-D84A-C032-DE9E-4F0144239DBA}"/>
+          </ac:picMkLst>
+        </pc:picChg>
+        <pc:picChg chg="add del mod ord">
+          <ac:chgData name="Marcin Kowalski" userId="178edd39374db964" providerId="LiveId" clId="{E2CE7F14-F837-4086-B4C6-456164CFFF15}" dt="2022-12-08T22:58:53.809" v="303" actId="22"/>
+          <ac:picMkLst>
+            <pc:docMk/>
+            <pc:sldMk cId="1034767516" sldId="268"/>
+            <ac:picMk id="8" creationId="{E84B4A4D-7841-592F-DA27-A0F5D6F0DD3E}"/>
+          </ac:picMkLst>
+        </pc:picChg>
+        <pc:picChg chg="add del mod">
+          <ac:chgData name="Marcin Kowalski" userId="178edd39374db964" providerId="LiveId" clId="{E2CE7F14-F837-4086-B4C6-456164CFFF15}" dt="2022-12-08T23:02:03.410" v="344" actId="478"/>
+          <ac:picMkLst>
+            <pc:docMk/>
+            <pc:sldMk cId="1034767516" sldId="268"/>
+            <ac:picMk id="10" creationId="{80ECE233-C382-83A1-C4FC-D1CB9ACE6A79}"/>
+          </ac:picMkLst>
+        </pc:picChg>
+        <pc:picChg chg="add del mod">
+          <ac:chgData name="Marcin Kowalski" userId="178edd39374db964" providerId="LiveId" clId="{E2CE7F14-F837-4086-B4C6-456164CFFF15}" dt="2022-12-08T23:01:28.256" v="330" actId="478"/>
+          <ac:picMkLst>
+            <pc:docMk/>
+            <pc:sldMk cId="1034767516" sldId="268"/>
+            <ac:picMk id="12" creationId="{BF06A850-8300-0D9E-5D22-34BA38FC8869}"/>
+          </ac:picMkLst>
+        </pc:picChg>
+        <pc:picChg chg="add del mod">
+          <ac:chgData name="Marcin Kowalski" userId="178edd39374db964" providerId="LiveId" clId="{E2CE7F14-F837-4086-B4C6-456164CFFF15}" dt="2022-12-08T23:02:43.010" v="347" actId="478"/>
+          <ac:picMkLst>
+            <pc:docMk/>
+            <pc:sldMk cId="1034767516" sldId="268"/>
+            <ac:picMk id="16" creationId="{059DAAC3-7A7F-1ED7-79C0-58A91EC67E72}"/>
+          </ac:picMkLst>
+        </pc:picChg>
+        <pc:picChg chg="add mod">
+          <ac:chgData name="Marcin Kowalski" userId="178edd39374db964" providerId="LiveId" clId="{E2CE7F14-F837-4086-B4C6-456164CFFF15}" dt="2022-12-08T23:02:05.482" v="345" actId="1076"/>
+          <ac:picMkLst>
+            <pc:docMk/>
+            <pc:sldMk cId="1034767516" sldId="268"/>
+            <ac:picMk id="18" creationId="{A2033E0A-3255-BD56-7C81-F4DD0D3EF6DC}"/>
+          </ac:picMkLst>
+        </pc:picChg>
+        <pc:picChg chg="add mod modCrop">
+          <ac:chgData name="Marcin Kowalski" userId="178edd39374db964" providerId="LiveId" clId="{E2CE7F14-F837-4086-B4C6-456164CFFF15}" dt="2022-12-08T23:03:10.584" v="353" actId="1035"/>
+          <ac:picMkLst>
+            <pc:docMk/>
+            <pc:sldMk cId="1034767516" sldId="268"/>
+            <ac:picMk id="20" creationId="{9DF2C076-F2C2-8A03-3448-5FEBC24C1024}"/>
+          </ac:picMkLst>
+        </pc:picChg>
+      </pc:sldChg>
+      <pc:sldChg chg="addSp delSp modSp new mod ord modClrScheme chgLayout">
+        <pc:chgData name="Marcin Kowalski" userId="178edd39374db964" providerId="LiveId" clId="{E2CE7F14-F837-4086-B4C6-456164CFFF15}" dt="2022-12-09T12:26:22.329" v="451" actId="20577"/>
+        <pc:sldMkLst>
+          <pc:docMk/>
+          <pc:sldMk cId="3236478244" sldId="269"/>
+        </pc:sldMkLst>
+        <pc:spChg chg="mod ord">
+          <ac:chgData name="Marcin Kowalski" userId="178edd39374db964" providerId="LiveId" clId="{E2CE7F14-F837-4086-B4C6-456164CFFF15}" dt="2022-12-09T12:26:22.329" v="451" actId="20577"/>
+          <ac:spMkLst>
+            <pc:docMk/>
+            <pc:sldMk cId="3236478244" sldId="269"/>
+            <ac:spMk id="2" creationId="{E605D8CB-5EEC-B8C7-0BD1-839995019301}"/>
+          </ac:spMkLst>
+        </pc:spChg>
+        <pc:spChg chg="del mod ord">
+          <ac:chgData name="Marcin Kowalski" userId="178edd39374db964" providerId="LiveId" clId="{E2CE7F14-F837-4086-B4C6-456164CFFF15}" dt="2022-12-09T12:04:27.455" v="414" actId="700"/>
+          <ac:spMkLst>
+            <pc:docMk/>
+            <pc:sldMk cId="3236478244" sldId="269"/>
+            <ac:spMk id="3" creationId="{3B1624CF-30C8-D71A-9184-4D6BC11572BA}"/>
+          </ac:spMkLst>
+        </pc:spChg>
+        <pc:spChg chg="del mod">
+          <ac:chgData name="Marcin Kowalski" userId="178edd39374db964" providerId="LiveId" clId="{E2CE7F14-F837-4086-B4C6-456164CFFF15}" dt="2022-12-09T12:04:27.455" v="414" actId="700"/>
+          <ac:spMkLst>
+            <pc:docMk/>
+            <pc:sldMk cId="3236478244" sldId="269"/>
+            <ac:spMk id="4" creationId="{6760284D-7EFE-EB1C-26AA-7977463CAF42}"/>
+          </ac:spMkLst>
+        </pc:spChg>
+        <pc:spChg chg="add del mod ord">
+          <ac:chgData name="Marcin Kowalski" userId="178edd39374db964" providerId="LiveId" clId="{E2CE7F14-F837-4086-B4C6-456164CFFF15}" dt="2022-12-09T12:11:12.973" v="415" actId="478"/>
+          <ac:spMkLst>
+            <pc:docMk/>
+            <pc:sldMk cId="3236478244" sldId="269"/>
+            <ac:spMk id="5" creationId="{117DB277-D84F-78EE-A027-65327DC071D3}"/>
+          </ac:spMkLst>
+        </pc:spChg>
+        <pc:picChg chg="add">
+          <ac:chgData name="Marcin Kowalski" userId="178edd39374db964" providerId="LiveId" clId="{E2CE7F14-F837-4086-B4C6-456164CFFF15}" dt="2022-12-09T12:11:13.966" v="416" actId="22"/>
+          <ac:picMkLst>
+            <pc:docMk/>
+            <pc:sldMk cId="3236478244" sldId="269"/>
+            <ac:picMk id="7" creationId="{E1F2ECD4-891C-1B1E-07AA-D005AE957419}"/>
+          </ac:picMkLst>
+        </pc:picChg>
+      </pc:sldChg>
+      <pc:sldChg chg="addSp delSp modSp add mod">
+        <pc:chgData name="Marcin Kowalski" userId="178edd39374db964" providerId="LiveId" clId="{E2CE7F14-F837-4086-B4C6-456164CFFF15}" dt="2022-12-09T12:24:09.410" v="446" actId="1076"/>
+        <pc:sldMkLst>
+          <pc:docMk/>
+          <pc:sldMk cId="3928470336" sldId="270"/>
+        </pc:sldMkLst>
+        <pc:spChg chg="mod">
+          <ac:chgData name="Marcin Kowalski" userId="178edd39374db964" providerId="LiveId" clId="{E2CE7F14-F837-4086-B4C6-456164CFFF15}" dt="2022-12-09T12:24:09.410" v="446" actId="1076"/>
+          <ac:spMkLst>
+            <pc:docMk/>
+            <pc:sldMk cId="3928470336" sldId="270"/>
+            <ac:spMk id="2" creationId="{364FB505-6974-4722-7F1B-24E5EE81E408}"/>
+          </ac:spMkLst>
+        </pc:spChg>
+        <pc:picChg chg="add mod">
+          <ac:chgData name="Marcin Kowalski" userId="178edd39374db964" providerId="LiveId" clId="{E2CE7F14-F837-4086-B4C6-456164CFFF15}" dt="2022-12-09T12:24:03.931" v="445" actId="12788"/>
+          <ac:picMkLst>
+            <pc:docMk/>
+            <pc:sldMk cId="3928470336" sldId="270"/>
+            <ac:picMk id="4" creationId="{E4D08683-B97A-CCB6-E9FF-56A8D1904EEB}"/>
+          </ac:picMkLst>
+        </pc:picChg>
+        <pc:picChg chg="del">
+          <ac:chgData name="Marcin Kowalski" userId="178edd39374db964" providerId="LiveId" clId="{E2CE7F14-F837-4086-B4C6-456164CFFF15}" dt="2022-12-09T12:23:55.533" v="441" actId="478"/>
+          <ac:picMkLst>
+            <pc:docMk/>
+            <pc:sldMk cId="3928470336" sldId="270"/>
+            <ac:picMk id="7" creationId="{EE263A22-A02D-DC45-043B-5579AC04185E}"/>
+          </ac:picMkLst>
+        </pc:picChg>
+      </pc:sldChg>
+    </pc:docChg>
+  </pc:docChgLst>
   <pc:docChgLst>
     <pc:chgData name="Marcin Kowalski" userId="178edd39374db964" providerId="LiveId" clId="{52B78D96-4DBE-4D50-A71C-C7AA807E2802}"/>
     <pc:docChg chg="undo custSel addSld delSld modSld">
@@ -335,7 +659,7 @@
             <a:pPr rtl="0"/>
             <a:fld id="{11F6B162-B019-4558-B36F-3F7010E42FDF}" type="datetime1">
               <a:rPr lang="pl-PL" smtClean="0"/>
-              <a:t>02.12.2022</a:t>
+              <a:t>09.12.2022</a:t>
             </a:fld>
             <a:endParaRPr lang="pl-PL" dirty="0"/>
           </a:p>
@@ -504,7 +828,7 @@
             <a:fld id="{F8FD5293-0EA9-4B42-A238-C80836CA7D9E}" type="datetime1">
               <a:rPr lang="pl-PL" smtClean="0"/>
               <a:pPr/>
-              <a:t>02.12.2022</a:t>
+              <a:t>09.12.2022</a:t>
             </a:fld>
             <a:endParaRPr lang="pl-PL" dirty="0"/>
           </a:p>
@@ -945,91 +1269,6 @@
 </p:notes>
 </file>
 
-<file path=ppt/notesSlides/notesSlide3.xml><?xml version="1.0" encoding="utf-8"?>
-<p:notes xmlns:a="http://schemas.openxmlformats.org/drawingml/2006/main" xmlns:r="http://schemas.openxmlformats.org/officeDocument/2006/relationships" xmlns:p="http://schemas.openxmlformats.org/presentationml/2006/main">
-  <p:cSld>
-    <p:spTree>
-      <p:nvGrpSpPr>
-        <p:cNvPr id="1" name=""/>
-        <p:cNvGrpSpPr/>
-        <p:nvPr/>
-      </p:nvGrpSpPr>
-      <p:grpSpPr>
-        <a:xfrm>
-          <a:off x="0" y="0"/>
-          <a:ext cx="0" cy="0"/>
-          <a:chOff x="0" y="0"/>
-          <a:chExt cx="0" cy="0"/>
-        </a:xfrm>
-      </p:grpSpPr>
-      <p:sp>
-        <p:nvSpPr>
-          <p:cNvPr id="2" name="Symbol zastępczy obrazu slajdu 1"/>
-          <p:cNvSpPr>
-            <a:spLocks noGrp="1" noRot="1" noChangeAspect="1"/>
-          </p:cNvSpPr>
-          <p:nvPr>
-            <p:ph type="sldImg"/>
-          </p:nvPr>
-        </p:nvSpPr>
-        <p:spPr/>
-      </p:sp>
-      <p:sp>
-        <p:nvSpPr>
-          <p:cNvPr id="3" name="Symbol zastępczy notatek 2"/>
-          <p:cNvSpPr>
-            <a:spLocks noGrp="1"/>
-          </p:cNvSpPr>
-          <p:nvPr>
-            <p:ph type="body" idx="1"/>
-          </p:nvPr>
-        </p:nvSpPr>
-        <p:spPr/>
-        <p:txBody>
-          <a:bodyPr/>
-          <a:lstStyle/>
-          <a:p>
-            <a:endParaRPr lang="pl-PL"/>
-          </a:p>
-        </p:txBody>
-      </p:sp>
-      <p:sp>
-        <p:nvSpPr>
-          <p:cNvPr id="4" name="Symbol zastępczy numeru slajdu 3"/>
-          <p:cNvSpPr>
-            <a:spLocks noGrp="1"/>
-          </p:cNvSpPr>
-          <p:nvPr>
-            <p:ph type="sldNum" sz="quarter" idx="10"/>
-          </p:nvPr>
-        </p:nvSpPr>
-        <p:spPr/>
-        <p:txBody>
-          <a:bodyPr/>
-          <a:lstStyle/>
-          <a:p>
-            <a:pPr rtl="0"/>
-            <a:fld id="{82869989-EB00-4EE7-BCB5-25BDC5BB29F8}" type="slidenum">
-              <a:rPr lang="pl-PL" smtClean="0"/>
-              <a:t>3</a:t>
-            </a:fld>
-            <a:endParaRPr lang="pl-PL"/>
-          </a:p>
-        </p:txBody>
-      </p:sp>
-    </p:spTree>
-    <p:extLst>
-      <p:ext uri="{BB962C8B-B14F-4D97-AF65-F5344CB8AC3E}">
-        <p14:creationId xmlns:p14="http://schemas.microsoft.com/office/powerpoint/2010/main" val="3811755871"/>
-      </p:ext>
-    </p:extLst>
-  </p:cSld>
-  <p:clrMapOvr>
-    <a:masterClrMapping/>
-  </p:clrMapOvr>
-</p:notes>
-</file>
-
 <file path=ppt/slideLayouts/slideLayout1.xml><?xml version="1.0" encoding="utf-8"?>
 <p:sldLayout xmlns:a="http://schemas.openxmlformats.org/drawingml/2006/main" xmlns:r="http://schemas.openxmlformats.org/officeDocument/2006/relationships" xmlns:p="http://schemas.openxmlformats.org/presentationml/2006/main" showMasterSp="0" type="title" preserve="1">
   <p:cSld name="Slajd tytułowy">
@@ -3185,7 +3424,7 @@
             <a:fld id="{70E306AB-97F8-4E2E-BF87-8C3481B5FBD8}" type="datetime1">
               <a:rPr lang="pl-PL" smtClean="0"/>
               <a:pPr/>
-              <a:t>02.12.2022</a:t>
+              <a:t>09.12.2022</a:t>
             </a:fld>
             <a:endParaRPr lang="pl-PL" dirty="0"/>
           </a:p>
@@ -3391,7 +3630,7 @@
             <a:fld id="{54F57989-D074-470C-8B53-0A83600092FA}" type="datetime1">
               <a:rPr lang="pl-PL" smtClean="0"/>
               <a:pPr/>
-              <a:t>02.12.2022</a:t>
+              <a:t>09.12.2022</a:t>
             </a:fld>
             <a:endParaRPr lang="pl-PL" dirty="0"/>
           </a:p>
@@ -3587,7 +3826,7 @@
             <a:fld id="{513EF585-5FBB-4299-9362-D527BD2675CD}" type="datetime1">
               <a:rPr lang="pl-PL" smtClean="0"/>
               <a:pPr/>
-              <a:t>02.12.2022</a:t>
+              <a:t>09.12.2022</a:t>
             </a:fld>
             <a:endParaRPr lang="pl-PL" dirty="0"/>
           </a:p>
@@ -5937,7 +6176,7 @@
             <a:fld id="{9D0E908B-D51D-4142-A5CB-EE5D4309B568}" type="datetime1">
               <a:rPr lang="pl-PL" smtClean="0"/>
               <a:pPr/>
-              <a:t>02.12.2022</a:t>
+              <a:t>09.12.2022</a:t>
             </a:fld>
             <a:endParaRPr lang="pl-PL" dirty="0"/>
           </a:p>
@@ -6399,7 +6638,7 @@
             <a:fld id="{4CB382C9-380C-424E-AF82-A6E8CC1E028B}" type="datetime1">
               <a:rPr lang="pl-PL" smtClean="0"/>
               <a:pPr/>
-              <a:t>02.12.2022</a:t>
+              <a:t>09.12.2022</a:t>
             </a:fld>
             <a:endParaRPr lang="pl-PL" dirty="0"/>
           </a:p>
@@ -6539,7 +6778,7 @@
             <a:fld id="{9B9CB9CC-4696-4285-BA6C-9DFABDF44C2A}" type="datetime1">
               <a:rPr lang="pl-PL" smtClean="0"/>
               <a:pPr/>
-              <a:t>02.12.2022</a:t>
+              <a:t>09.12.2022</a:t>
             </a:fld>
             <a:endParaRPr lang="pl-PL" dirty="0"/>
           </a:p>
@@ -8479,7 +8718,7 @@
             <a:fld id="{DF0DF4F9-CFFF-4A1E-866B-3C5280452CB1}" type="datetime1">
               <a:rPr lang="pl-PL" smtClean="0"/>
               <a:pPr/>
-              <a:t>02.12.2022</a:t>
+              <a:t>09.12.2022</a:t>
             </a:fld>
             <a:endParaRPr lang="pl-PL" dirty="0"/>
           </a:p>
@@ -10740,7 +10979,7 @@
             <a:fld id="{BCE2E449-FA09-4791-AF38-A83448FE51DA}" type="datetime1">
               <a:rPr lang="pl-PL" smtClean="0"/>
               <a:pPr/>
-              <a:t>02.12.2022</a:t>
+              <a:t>09.12.2022</a:t>
             </a:fld>
             <a:endParaRPr lang="pl-PL" dirty="0"/>
           </a:p>
@@ -15038,7 +15277,7 @@
             <a:fld id="{7465ED12-3D75-43E0-9D6D-9FB5D68B824D}" type="datetime1">
               <a:rPr lang="pl-PL" smtClean="0"/>
               <a:pPr/>
-              <a:t>02.12.2022</a:t>
+              <a:t>09.12.2022</a:t>
             </a:fld>
             <a:endParaRPr lang="pl-PL" dirty="0"/>
           </a:p>
@@ -15607,7 +15846,15 @@
             <a:pPr rtl="0"/>
             <a:r>
               <a:rPr lang="pl-PL" dirty="0"/>
-              <a:t>Co to jest wyjątek</a:t>
+              <a:t>Co to są wyjątki (ang. </a:t>
+            </a:r>
+            <a:r>
+              <a:rPr lang="pl-PL" dirty="0" err="1"/>
+              <a:t>Exceptions</a:t>
+            </a:r>
+            <a:r>
+              <a:rPr lang="pl-PL" dirty="0"/>
+              <a:t>)?</a:t>
             </a:r>
           </a:p>
         </p:txBody>
@@ -15624,8 +15871,8 @@
         </p:nvSpPr>
         <p:spPr>
           <a:xfrm>
-            <a:off x="6324600" y="1981199"/>
-            <a:ext cx="4572000" cy="3810001"/>
+            <a:off x="6324600" y="2422848"/>
+            <a:ext cx="4572000" cy="2012303"/>
           </a:xfrm>
         </p:spPr>
         <p:txBody>
@@ -15637,15 +15884,7 @@
             <a:pPr rtl="0"/>
             <a:r>
               <a:rPr lang="pl-PL" dirty="0"/>
-              <a:t>Wyjątki </a:t>
-            </a:r>
-            <a:r>
-              <a:rPr lang="pl-PL" u="sng" dirty="0"/>
-              <a:t>pozwalają zachować kontrolę </a:t>
-            </a:r>
-            <a:r>
-              <a:rPr lang="pl-PL" dirty="0"/>
-              <a:t>nad przebiegiem wykonania funkcji (metod), a także pojedynczych instrukcji zawartych w funkcjach. Wyjątek jest zdarzeniem, które pojawia się podczas wykonania i rozrywa normalną kolejność wykonania instrukcji.</a:t>
+              <a:t>Mechanizm obsługi sytuacji wyjątkowych (zazwyczaj błędów), których wystąpienie zmienia prawidłowy przebieg wykonywania programu</a:t>
             </a:r>
           </a:p>
         </p:txBody>
@@ -15763,7 +16002,13 @@
       </p:grpSpPr>
       <p:sp>
         <p:nvSpPr>
-          <p:cNvPr id="2" name="Tytuł 1"/>
+          <p:cNvPr id="2" name="Tytuł 1">
+            <a:extLst>
+              <a:ext uri="{FF2B5EF4-FFF2-40B4-BE49-F238E27FC236}">
+                <a16:creationId xmlns:a16="http://schemas.microsoft.com/office/drawing/2014/main" id="{274A7E54-0D53-6E87-EFAD-4343C3D4CC51}"/>
+              </a:ext>
+            </a:extLst>
+          </p:cNvPr>
           <p:cNvSpPr>
             <a:spLocks noGrp="1"/>
           </p:cNvSpPr>
@@ -15773,23 +16018,22 @@
         </p:nvSpPr>
         <p:spPr/>
         <p:txBody>
-          <a:bodyPr rtlCol="0"/>
+          <a:bodyPr/>
           <a:lstStyle/>
           <a:p>
-            <a:pPr rtl="0"/>
             <a:r>
               <a:rPr lang="pl-PL" dirty="0"/>
-              <a:t>Obsługa wyjątków</a:t>
+              <a:t>Podstawy obsługi wyjątków</a:t>
             </a:r>
           </a:p>
         </p:txBody>
       </p:sp>
       <p:sp>
         <p:nvSpPr>
-          <p:cNvPr id="4" name="Symbol zastępczy zawartości 3">
+          <p:cNvPr id="3" name="Symbol zastępczy zawartości 2">
             <a:extLst>
               <a:ext uri="{FF2B5EF4-FFF2-40B4-BE49-F238E27FC236}">
-                <a16:creationId xmlns:a16="http://schemas.microsoft.com/office/drawing/2014/main" id="{AC87FB59-F3BA-7EA6-2198-F301B91978E4}"/>
+                <a16:creationId xmlns:a16="http://schemas.microsoft.com/office/drawing/2014/main" id="{630E54FB-D404-1A4A-6392-1D9EF622CA77}"/>
               </a:ext>
             </a:extLst>
           </p:cNvPr>
@@ -15805,51 +16049,62 @@
           <a:bodyPr/>
           <a:lstStyle/>
           <a:p>
+            <a:pPr algn="l"/>
             <a:r>
-              <a:rPr lang="pl-PL" dirty="0"/>
-              <a:t>Wyjątki są wyrzucane i propagowane tak długo jak długo pozostają nie przechwycone w </a:t>
-            </a:r>
-            <a:r>
-              <a:rPr lang="pl-PL" dirty="0" err="1"/>
-              <a:t>kodzieprogramu</a:t>
-            </a:r>
-            <a:r>
-              <a:rPr lang="pl-PL" dirty="0"/>
-              <a:t>. Wyjątki nie przechwycone propagują się aż do metody </a:t>
-            </a:r>
-            <a:r>
-              <a:rPr lang="pl-PL" dirty="0" err="1"/>
-              <a:t>main</a:t>
-            </a:r>
-            <a:r>
-              <a:rPr lang="pl-PL" dirty="0"/>
-              <a:t>(...) i jeśli także tam nie </a:t>
-            </a:r>
-            <a:r>
-              <a:rPr lang="pl-PL" dirty="0" err="1"/>
-              <a:t>sąprzechwycone</a:t>
-            </a:r>
-            <a:r>
-              <a:rPr lang="pl-PL" dirty="0"/>
-              <a:t> powodują przerwanie wykonania programu.</a:t>
+              <a:rPr lang="pl-PL" sz="1800" b="1" i="0" u="none" strike="noStrike" baseline="0" dirty="0">
+                <a:latin typeface="Arial" panose="020B0604020202020204" pitchFamily="34" charset="0"/>
+              </a:rPr>
+              <a:t>Problem, który wstrzymuje wykonanie metody lub bloku.</a:t>
             </a:r>
           </a:p>
           <a:p>
-            <a:endParaRPr lang="pl-PL" dirty="0"/>
+            <a:pPr marL="0" indent="0" algn="l">
+              <a:buNone/>
+            </a:pPr>
+            <a:endParaRPr lang="pl-PL" sz="1800" b="1">
+              <a:latin typeface="Arial" panose="020B0604020202020204" pitchFamily="34" charset="0"/>
+            </a:endParaRPr>
           </a:p>
           <a:p>
+            <a:pPr marL="0" indent="0" algn="l">
+              <a:buNone/>
+            </a:pPr>
+            <a:r>
+              <a:rPr lang="pl-PL" sz="1800" b="1">
+                <a:latin typeface="Arial" panose="020B0604020202020204" pitchFamily="34" charset="0"/>
+              </a:rPr>
+              <a:t>Przykład</a:t>
+            </a:r>
+            <a:r>
+              <a:rPr lang="pl-PL" sz="1800" b="1" dirty="0">
+                <a:latin typeface="Arial" panose="020B0604020202020204" pitchFamily="34" charset="0"/>
+              </a:rPr>
+              <a:t>:</a:t>
+            </a:r>
+          </a:p>
+          <a:p>
+            <a:pPr lvl="1"/>
             <a:r>
               <a:rPr lang="pl-PL" dirty="0"/>
-              <a:t>W celu przechwycenia i obsłużenia wyjątków w języku Java korzysta się z </a:t>
+              <a:t>Dzielenie przez 0</a:t>
             </a:r>
+          </a:p>
+          <a:p>
+            <a:pPr lvl="1"/>
             <a:r>
-              <a:rPr lang="pl-PL" dirty="0" err="1"/>
-              <a:t>blokutry-catch-finally</a:t>
+              <a:rPr lang="pl-PL" dirty="0"/>
+              <a:t>Pierwiastek z liczby ujemnej</a:t>
             </a:r>
+          </a:p>
+          <a:p>
+            <a:pPr lvl="1"/>
             <a:r>
-              <a:rPr lang="pl-PL"/>
-              <a:t>.</a:t>
+              <a:rPr lang="pl-PL" dirty="0"/>
+              <a:t>Walidacja argumentów metody (np. walidacja danych =&gt; wiek&lt;0)</a:t>
             </a:r>
+          </a:p>
+          <a:p>
+            <a:pPr lvl="1"/>
             <a:endParaRPr lang="pl-PL" dirty="0"/>
           </a:p>
         </p:txBody>
@@ -15857,7 +16112,7 @@
     </p:spTree>
     <p:extLst>
       <p:ext uri="{BB962C8B-B14F-4D97-AF65-F5344CB8AC3E}">
-        <p14:creationId xmlns:p14="http://schemas.microsoft.com/office/powerpoint/2010/main" val="1476019738"/>
+        <p14:creationId xmlns:p14="http://schemas.microsoft.com/office/powerpoint/2010/main" val="229441118"/>
       </p:ext>
     </p:extLst>
   </p:cSld>
@@ -15901,7 +16156,7 @@
           <p:cNvPr id="2" name="Tytuł 1">
             <a:extLst>
               <a:ext uri="{FF2B5EF4-FFF2-40B4-BE49-F238E27FC236}">
-                <a16:creationId xmlns:a16="http://schemas.microsoft.com/office/drawing/2014/main" id="{8E392867-9C00-633E-7D5F-A09E879E6066}"/>
+                <a16:creationId xmlns:a16="http://schemas.microsoft.com/office/drawing/2014/main" id="{1C0016D6-F732-BB78-6C80-217BC0967AA3}"/>
               </a:ext>
             </a:extLst>
           </p:cNvPr>
@@ -15912,47 +16167,86 @@
             <p:ph type="title"/>
           </p:nvPr>
         </p:nvSpPr>
-        <p:spPr/>
+        <p:spPr>
+          <a:xfrm>
+            <a:off x="1295400" y="-75585"/>
+            <a:ext cx="9601200" cy="1142385"/>
+          </a:xfrm>
+        </p:spPr>
         <p:txBody>
           <a:bodyPr/>
           <a:lstStyle/>
           <a:p>
             <a:r>
               <a:rPr lang="pl-PL" dirty="0"/>
-              <a:t>Podsumowanie</a:t>
+              <a:t>Przykład</a:t>
             </a:r>
           </a:p>
         </p:txBody>
       </p:sp>
-      <p:sp>
-        <p:nvSpPr>
-          <p:cNvPr id="3" name="Symbol zastępczy zawartości 2">
+      <p:pic>
+        <p:nvPicPr>
+          <p:cNvPr id="18" name="Obraz 17">
             <a:extLst>
               <a:ext uri="{FF2B5EF4-FFF2-40B4-BE49-F238E27FC236}">
-                <a16:creationId xmlns:a16="http://schemas.microsoft.com/office/drawing/2014/main" id="{91714D40-D172-98F4-8F5D-ED58B56114A4}"/>
+                <a16:creationId xmlns:a16="http://schemas.microsoft.com/office/drawing/2014/main" id="{A2033E0A-3255-BD56-7C81-F4DD0D3EF6DC}"/>
               </a:ext>
             </a:extLst>
           </p:cNvPr>
-          <p:cNvSpPr>
-            <a:spLocks noGrp="1"/>
-          </p:cNvSpPr>
-          <p:nvPr>
-            <p:ph idx="1"/>
-          </p:nvPr>
-        </p:nvSpPr>
-        <p:spPr/>
-        <p:txBody>
-          <a:bodyPr/>
-          <a:lstStyle/>
-          <a:p>
-            <a:endParaRPr lang="pl-PL"/>
-          </a:p>
-        </p:txBody>
-      </p:sp>
+          <p:cNvPicPr>
+            <a:picLocks noChangeAspect="1"/>
+          </p:cNvPicPr>
+          <p:nvPr/>
+        </p:nvPicPr>
+        <p:blipFill>
+          <a:blip r:embed="rId2"/>
+          <a:stretch>
+            <a:fillRect/>
+          </a:stretch>
+        </p:blipFill>
+        <p:spPr>
+          <a:xfrm>
+            <a:off x="1295400" y="3705860"/>
+            <a:ext cx="8210550" cy="2143125"/>
+          </a:xfrm>
+          <a:prstGeom prst="rect">
+            <a:avLst/>
+          </a:prstGeom>
+        </p:spPr>
+      </p:pic>
+      <p:pic>
+        <p:nvPicPr>
+          <p:cNvPr id="20" name="Obraz 19">
+            <a:extLst>
+              <a:ext uri="{FF2B5EF4-FFF2-40B4-BE49-F238E27FC236}">
+                <a16:creationId xmlns:a16="http://schemas.microsoft.com/office/drawing/2014/main" id="{9DF2C076-F2C2-8A03-3448-5FEBC24C1024}"/>
+              </a:ext>
+            </a:extLst>
+          </p:cNvPr>
+          <p:cNvPicPr>
+            <a:picLocks noChangeAspect="1"/>
+          </p:cNvPicPr>
+          <p:nvPr/>
+        </p:nvPicPr>
+        <p:blipFill rotWithShape="1">
+          <a:blip r:embed="rId3"/>
+          <a:srcRect r="7709"/>
+          <a:stretch/>
+        </p:blipFill>
+        <p:spPr>
+          <a:xfrm>
+            <a:off x="1295400" y="1305948"/>
+            <a:ext cx="8210550" cy="2381250"/>
+          </a:xfrm>
+          <a:prstGeom prst="rect">
+            <a:avLst/>
+          </a:prstGeom>
+        </p:spPr>
+      </p:pic>
     </p:spTree>
     <p:extLst>
       <p:ext uri="{BB962C8B-B14F-4D97-AF65-F5344CB8AC3E}">
-        <p14:creationId xmlns:p14="http://schemas.microsoft.com/office/powerpoint/2010/main" val="4112112865"/>
+        <p14:creationId xmlns:p14="http://schemas.microsoft.com/office/powerpoint/2010/main" val="1034767516"/>
       </p:ext>
     </p:extLst>
   </p:cSld>
@@ -15975,6 +16269,507 @@
 </file>
 
 <file path=ppt/slides/slide5.xml><?xml version="1.0" encoding="utf-8"?>
+<p:sld xmlns:a="http://schemas.openxmlformats.org/drawingml/2006/main" xmlns:r="http://schemas.openxmlformats.org/officeDocument/2006/relationships" xmlns:p="http://schemas.openxmlformats.org/presentationml/2006/main">
+  <p:cSld>
+    <p:spTree>
+      <p:nvGrpSpPr>
+        <p:cNvPr id="1" name=""/>
+        <p:cNvGrpSpPr/>
+        <p:nvPr/>
+      </p:nvGrpSpPr>
+      <p:grpSpPr>
+        <a:xfrm>
+          <a:off x="0" y="0"/>
+          <a:ext cx="0" cy="0"/>
+          <a:chOff x="0" y="0"/>
+          <a:chExt cx="0" cy="0"/>
+        </a:xfrm>
+      </p:grpSpPr>
+      <p:sp>
+        <p:nvSpPr>
+          <p:cNvPr id="2" name="Tytuł 1">
+            <a:extLst>
+              <a:ext uri="{FF2B5EF4-FFF2-40B4-BE49-F238E27FC236}">
+                <a16:creationId xmlns:a16="http://schemas.microsoft.com/office/drawing/2014/main" id="{E605D8CB-5EEC-B8C7-0BD1-839995019301}"/>
+              </a:ext>
+            </a:extLst>
+          </p:cNvPr>
+          <p:cNvSpPr>
+            <a:spLocks noGrp="1"/>
+          </p:cNvSpPr>
+          <p:nvPr>
+            <p:ph type="title"/>
+          </p:nvPr>
+        </p:nvSpPr>
+        <p:spPr/>
+        <p:txBody>
+          <a:bodyPr/>
+          <a:lstStyle/>
+          <a:p>
+            <a:r>
+              <a:rPr lang="pl-PL" dirty="0" err="1"/>
+              <a:t>Try</a:t>
+            </a:r>
+            <a:r>
+              <a:rPr lang="pl-PL" dirty="0"/>
+              <a:t> &amp; </a:t>
+            </a:r>
+            <a:r>
+              <a:rPr lang="pl-PL" dirty="0" err="1"/>
+              <a:t>catch</a:t>
+            </a:r>
+            <a:endParaRPr lang="pl-PL" dirty="0"/>
+          </a:p>
+        </p:txBody>
+      </p:sp>
+      <p:pic>
+        <p:nvPicPr>
+          <p:cNvPr id="7" name="Obraz 6">
+            <a:extLst>
+              <a:ext uri="{FF2B5EF4-FFF2-40B4-BE49-F238E27FC236}">
+                <a16:creationId xmlns:a16="http://schemas.microsoft.com/office/drawing/2014/main" id="{E1F2ECD4-891C-1B1E-07AA-D005AE957419}"/>
+              </a:ext>
+            </a:extLst>
+          </p:cNvPr>
+          <p:cNvPicPr>
+            <a:picLocks noChangeAspect="1"/>
+          </p:cNvPicPr>
+          <p:nvPr/>
+        </p:nvPicPr>
+        <p:blipFill>
+          <a:blip r:embed="rId2"/>
+          <a:stretch>
+            <a:fillRect/>
+          </a:stretch>
+        </p:blipFill>
+        <p:spPr>
+          <a:xfrm>
+            <a:off x="1566862" y="1833562"/>
+            <a:ext cx="9058275" cy="3190875"/>
+          </a:xfrm>
+          <a:prstGeom prst="rect">
+            <a:avLst/>
+          </a:prstGeom>
+        </p:spPr>
+      </p:pic>
+    </p:spTree>
+    <p:extLst>
+      <p:ext uri="{BB962C8B-B14F-4D97-AF65-F5344CB8AC3E}">
+        <p14:creationId xmlns:p14="http://schemas.microsoft.com/office/powerpoint/2010/main" val="3236478244"/>
+      </p:ext>
+    </p:extLst>
+  </p:cSld>
+  <p:clrMapOvr>
+    <a:masterClrMapping/>
+  </p:clrMapOvr>
+  <mc:AlternateContent xmlns:mc="http://schemas.openxmlformats.org/markup-compatibility/2006" xmlns:p14="http://schemas.microsoft.com/office/powerpoint/2010/main">
+    <mc:Choice Requires="p14">
+      <p:transition spd="med" p14:dur="700">
+        <p:fade/>
+      </p:transition>
+    </mc:Choice>
+    <mc:Fallback xmlns="">
+      <p:transition spd="med">
+        <p:fade/>
+      </p:transition>
+    </mc:Fallback>
+  </mc:AlternateContent>
+</p:sld>
+</file>
+
+<file path=ppt/slides/slide6.xml><?xml version="1.0" encoding="utf-8"?>
+<p:sld xmlns:a="http://schemas.openxmlformats.org/drawingml/2006/main" xmlns:r="http://schemas.openxmlformats.org/officeDocument/2006/relationships" xmlns:p="http://schemas.openxmlformats.org/presentationml/2006/main">
+  <p:cSld>
+    <p:spTree>
+      <p:nvGrpSpPr>
+        <p:cNvPr id="1" name=""/>
+        <p:cNvGrpSpPr/>
+        <p:nvPr/>
+      </p:nvGrpSpPr>
+      <p:grpSpPr>
+        <a:xfrm>
+          <a:off x="0" y="0"/>
+          <a:ext cx="0" cy="0"/>
+          <a:chOff x="0" y="0"/>
+          <a:chExt cx="0" cy="0"/>
+        </a:xfrm>
+      </p:grpSpPr>
+      <p:sp>
+        <p:nvSpPr>
+          <p:cNvPr id="2" name="Tytuł 1">
+            <a:extLst>
+              <a:ext uri="{FF2B5EF4-FFF2-40B4-BE49-F238E27FC236}">
+                <a16:creationId xmlns:a16="http://schemas.microsoft.com/office/drawing/2014/main" id="{364FB505-6974-4722-7F1B-24E5EE81E408}"/>
+              </a:ext>
+            </a:extLst>
+          </p:cNvPr>
+          <p:cNvSpPr>
+            <a:spLocks noGrp="1"/>
+          </p:cNvSpPr>
+          <p:nvPr>
+            <p:ph type="title"/>
+          </p:nvPr>
+        </p:nvSpPr>
+        <p:spPr>
+          <a:xfrm>
+            <a:off x="1490663" y="-314028"/>
+            <a:ext cx="9601200" cy="1142385"/>
+          </a:xfrm>
+        </p:spPr>
+        <p:txBody>
+          <a:bodyPr/>
+          <a:lstStyle/>
+          <a:p>
+            <a:r>
+              <a:rPr lang="pl-PL" dirty="0"/>
+              <a:t>Przykład</a:t>
+            </a:r>
+          </a:p>
+        </p:txBody>
+      </p:sp>
+      <p:pic>
+        <p:nvPicPr>
+          <p:cNvPr id="7" name="Obraz 6">
+            <a:extLst>
+              <a:ext uri="{FF2B5EF4-FFF2-40B4-BE49-F238E27FC236}">
+                <a16:creationId xmlns:a16="http://schemas.microsoft.com/office/drawing/2014/main" id="{EE263A22-A02D-DC45-043B-5579AC04185E}"/>
+              </a:ext>
+            </a:extLst>
+          </p:cNvPr>
+          <p:cNvPicPr>
+            <a:picLocks noChangeAspect="1"/>
+          </p:cNvPicPr>
+          <p:nvPr/>
+        </p:nvPicPr>
+        <p:blipFill>
+          <a:blip r:embed="rId2"/>
+          <a:stretch>
+            <a:fillRect/>
+          </a:stretch>
+        </p:blipFill>
+        <p:spPr>
+          <a:xfrm>
+            <a:off x="1490663" y="1041719"/>
+            <a:ext cx="9210676" cy="5038724"/>
+          </a:xfrm>
+          <a:prstGeom prst="rect">
+            <a:avLst/>
+          </a:prstGeom>
+        </p:spPr>
+      </p:pic>
+    </p:spTree>
+    <p:extLst>
+      <p:ext uri="{BB962C8B-B14F-4D97-AF65-F5344CB8AC3E}">
+        <p14:creationId xmlns:p14="http://schemas.microsoft.com/office/powerpoint/2010/main" val="1062117154"/>
+      </p:ext>
+    </p:extLst>
+  </p:cSld>
+  <p:clrMapOvr>
+    <a:masterClrMapping/>
+  </p:clrMapOvr>
+  <mc:AlternateContent xmlns:mc="http://schemas.openxmlformats.org/markup-compatibility/2006" xmlns:p14="http://schemas.microsoft.com/office/powerpoint/2010/main">
+    <mc:Choice Requires="p14">
+      <p:transition spd="med" p14:dur="700">
+        <p:fade/>
+      </p:transition>
+    </mc:Choice>
+    <mc:Fallback xmlns="">
+      <p:transition spd="med">
+        <p:fade/>
+      </p:transition>
+    </mc:Fallback>
+  </mc:AlternateContent>
+</p:sld>
+</file>
+
+<file path=ppt/slides/slide7.xml><?xml version="1.0" encoding="utf-8"?>
+<p:sld xmlns:a="http://schemas.openxmlformats.org/drawingml/2006/main" xmlns:r="http://schemas.openxmlformats.org/officeDocument/2006/relationships" xmlns:p="http://schemas.openxmlformats.org/presentationml/2006/main">
+  <p:cSld>
+    <p:spTree>
+      <p:nvGrpSpPr>
+        <p:cNvPr id="1" name=""/>
+        <p:cNvGrpSpPr/>
+        <p:nvPr/>
+      </p:nvGrpSpPr>
+      <p:grpSpPr>
+        <a:xfrm>
+          <a:off x="0" y="0"/>
+          <a:ext cx="0" cy="0"/>
+          <a:chOff x="0" y="0"/>
+          <a:chExt cx="0" cy="0"/>
+        </a:xfrm>
+      </p:grpSpPr>
+      <p:sp>
+        <p:nvSpPr>
+          <p:cNvPr id="2" name="Tytuł 1">
+            <a:extLst>
+              <a:ext uri="{FF2B5EF4-FFF2-40B4-BE49-F238E27FC236}">
+                <a16:creationId xmlns:a16="http://schemas.microsoft.com/office/drawing/2014/main" id="{364FB505-6974-4722-7F1B-24E5EE81E408}"/>
+              </a:ext>
+            </a:extLst>
+          </p:cNvPr>
+          <p:cNvSpPr>
+            <a:spLocks noGrp="1"/>
+          </p:cNvSpPr>
+          <p:nvPr>
+            <p:ph type="title"/>
+          </p:nvPr>
+        </p:nvSpPr>
+        <p:spPr>
+          <a:xfrm>
+            <a:off x="1490663" y="468292"/>
+            <a:ext cx="9601200" cy="1142385"/>
+          </a:xfrm>
+        </p:spPr>
+        <p:txBody>
+          <a:bodyPr/>
+          <a:lstStyle/>
+          <a:p>
+            <a:r>
+              <a:rPr lang="pl-PL" dirty="0"/>
+              <a:t>Przykład</a:t>
+            </a:r>
+          </a:p>
+        </p:txBody>
+      </p:sp>
+      <p:pic>
+        <p:nvPicPr>
+          <p:cNvPr id="4" name="Obraz 3">
+            <a:extLst>
+              <a:ext uri="{FF2B5EF4-FFF2-40B4-BE49-F238E27FC236}">
+                <a16:creationId xmlns:a16="http://schemas.microsoft.com/office/drawing/2014/main" id="{E4D08683-B97A-CCB6-E9FF-56A8D1904EEB}"/>
+              </a:ext>
+            </a:extLst>
+          </p:cNvPr>
+          <p:cNvPicPr>
+            <a:picLocks noChangeAspect="1"/>
+          </p:cNvPicPr>
+          <p:nvPr/>
+        </p:nvPicPr>
+        <p:blipFill>
+          <a:blip r:embed="rId2"/>
+          <a:stretch>
+            <a:fillRect/>
+          </a:stretch>
+        </p:blipFill>
+        <p:spPr>
+          <a:xfrm>
+            <a:off x="2185047" y="2230616"/>
+            <a:ext cx="7821906" cy="2192337"/>
+          </a:xfrm>
+          <a:prstGeom prst="rect">
+            <a:avLst/>
+          </a:prstGeom>
+        </p:spPr>
+      </p:pic>
+    </p:spTree>
+    <p:extLst>
+      <p:ext uri="{BB962C8B-B14F-4D97-AF65-F5344CB8AC3E}">
+        <p14:creationId xmlns:p14="http://schemas.microsoft.com/office/powerpoint/2010/main" val="3928470336"/>
+      </p:ext>
+    </p:extLst>
+  </p:cSld>
+  <p:clrMapOvr>
+    <a:masterClrMapping/>
+  </p:clrMapOvr>
+  <mc:AlternateContent xmlns:mc="http://schemas.openxmlformats.org/markup-compatibility/2006" xmlns:p14="http://schemas.microsoft.com/office/powerpoint/2010/main">
+    <mc:Choice Requires="p14">
+      <p:transition spd="med" p14:dur="700">
+        <p:fade/>
+      </p:transition>
+    </mc:Choice>
+    <mc:Fallback xmlns="">
+      <p:transition spd="med">
+        <p:fade/>
+      </p:transition>
+    </mc:Fallback>
+  </mc:AlternateContent>
+</p:sld>
+</file>
+
+<file path=ppt/slides/slide8.xml><?xml version="1.0" encoding="utf-8"?>
+<p:sld xmlns:a="http://schemas.openxmlformats.org/drawingml/2006/main" xmlns:r="http://schemas.openxmlformats.org/officeDocument/2006/relationships" xmlns:p="http://schemas.openxmlformats.org/presentationml/2006/main">
+  <p:cSld>
+    <p:spTree>
+      <p:nvGrpSpPr>
+        <p:cNvPr id="1" name=""/>
+        <p:cNvGrpSpPr/>
+        <p:nvPr/>
+      </p:nvGrpSpPr>
+      <p:grpSpPr>
+        <a:xfrm>
+          <a:off x="0" y="0"/>
+          <a:ext cx="0" cy="0"/>
+          <a:chOff x="0" y="0"/>
+          <a:chExt cx="0" cy="0"/>
+        </a:xfrm>
+      </p:grpSpPr>
+      <p:sp>
+        <p:nvSpPr>
+          <p:cNvPr id="2" name="Tytuł 1">
+            <a:extLst>
+              <a:ext uri="{FF2B5EF4-FFF2-40B4-BE49-F238E27FC236}">
+                <a16:creationId xmlns:a16="http://schemas.microsoft.com/office/drawing/2014/main" id="{EEC63AE0-9878-68AE-6339-ED3116DB4105}"/>
+              </a:ext>
+            </a:extLst>
+          </p:cNvPr>
+          <p:cNvSpPr>
+            <a:spLocks noGrp="1"/>
+          </p:cNvSpPr>
+          <p:nvPr>
+            <p:ph type="title"/>
+          </p:nvPr>
+        </p:nvSpPr>
+        <p:spPr/>
+        <p:txBody>
+          <a:bodyPr/>
+          <a:lstStyle/>
+          <a:p>
+            <a:r>
+              <a:rPr lang="pl-PL" dirty="0"/>
+              <a:t>Najpopularniejsze wyjątki </a:t>
+            </a:r>
+          </a:p>
+        </p:txBody>
+      </p:sp>
+      <p:sp>
+        <p:nvSpPr>
+          <p:cNvPr id="3" name="Symbol zastępczy zawartości 2">
+            <a:extLst>
+              <a:ext uri="{FF2B5EF4-FFF2-40B4-BE49-F238E27FC236}">
+                <a16:creationId xmlns:a16="http://schemas.microsoft.com/office/drawing/2014/main" id="{52CEE514-82D1-5E99-1315-9E2E1FD38048}"/>
+              </a:ext>
+            </a:extLst>
+          </p:cNvPr>
+          <p:cNvSpPr>
+            <a:spLocks noGrp="1"/>
+          </p:cNvSpPr>
+          <p:nvPr>
+            <p:ph idx="1"/>
+          </p:nvPr>
+        </p:nvSpPr>
+        <p:spPr/>
+        <p:txBody>
+          <a:bodyPr/>
+          <a:lstStyle/>
+          <a:p>
+            <a:r>
+              <a:rPr lang="pl-PL" b="0" i="0" dirty="0" err="1">
+                <a:solidFill>
+                  <a:srgbClr val="676767"/>
+                </a:solidFill>
+                <a:effectLst/>
+                <a:latin typeface="Open Sans" panose="020B0604020202020204" pitchFamily="34" charset="0"/>
+              </a:rPr>
+              <a:t>NullPointerException</a:t>
+            </a:r>
+            <a:endParaRPr lang="pl-PL" b="0" i="0" dirty="0">
+              <a:solidFill>
+                <a:srgbClr val="676767"/>
+              </a:solidFill>
+              <a:effectLst/>
+              <a:latin typeface="Open Sans" panose="020B0604020202020204" pitchFamily="34" charset="0"/>
+            </a:endParaRPr>
+          </a:p>
+          <a:p>
+            <a:r>
+              <a:rPr lang="pl-PL" b="0" i="0" u="none" strike="noStrike" dirty="0" err="1">
+                <a:solidFill>
+                  <a:srgbClr val="3B8686"/>
+                </a:solidFill>
+                <a:effectLst/>
+                <a:latin typeface="Open Sans" panose="020B0606030504020204" pitchFamily="34" charset="0"/>
+                <a:hlinkClick r:id="rId2"/>
+              </a:rPr>
+              <a:t>IllegalArgumentException</a:t>
+            </a:r>
+            <a:endParaRPr lang="pl-PL" u="none" strike="noStrike" dirty="0">
+              <a:solidFill>
+                <a:srgbClr val="676767"/>
+              </a:solidFill>
+              <a:latin typeface="Open Sans" panose="020B0604020202020204" pitchFamily="34" charset="0"/>
+            </a:endParaRPr>
+          </a:p>
+          <a:p>
+            <a:r>
+              <a:rPr lang="pl-PL" b="0" i="0" dirty="0" err="1">
+                <a:solidFill>
+                  <a:srgbClr val="676767"/>
+                </a:solidFill>
+                <a:effectLst/>
+                <a:latin typeface="Open Sans" panose="020B0606030504020204" pitchFamily="34" charset="0"/>
+              </a:rPr>
+              <a:t>IOException</a:t>
+            </a:r>
+            <a:endParaRPr lang="pl-PL" b="0" i="0" dirty="0">
+              <a:solidFill>
+                <a:srgbClr val="676767"/>
+              </a:solidFill>
+              <a:effectLst/>
+              <a:latin typeface="Open Sans" panose="020B0604020202020204" pitchFamily="34" charset="0"/>
+            </a:endParaRPr>
+          </a:p>
+          <a:p>
+            <a:r>
+              <a:rPr lang="pl-PL" b="0" i="0" u="none" strike="noStrike" dirty="0" err="1">
+                <a:solidFill>
+                  <a:srgbClr val="3B8686"/>
+                </a:solidFill>
+                <a:effectLst/>
+                <a:latin typeface="Open Sans" panose="020B0606030504020204" pitchFamily="34" charset="0"/>
+                <a:hlinkClick r:id="rId3"/>
+              </a:rPr>
+              <a:t>NumberFormatException</a:t>
+            </a:r>
+            <a:endParaRPr lang="pl-PL" u="none" strike="noStrike" dirty="0">
+              <a:solidFill>
+                <a:srgbClr val="676767"/>
+              </a:solidFill>
+              <a:latin typeface="Open Sans" panose="020B0604020202020204" pitchFamily="34" charset="0"/>
+            </a:endParaRPr>
+          </a:p>
+          <a:p>
+            <a:r>
+              <a:rPr lang="pl-PL" b="0" i="0" u="none" strike="noStrike" dirty="0" err="1">
+                <a:solidFill>
+                  <a:srgbClr val="3B8686"/>
+                </a:solidFill>
+                <a:effectLst/>
+                <a:latin typeface="Open Sans" panose="020B0606030504020204" pitchFamily="34" charset="0"/>
+                <a:hlinkClick r:id="rId4"/>
+              </a:rPr>
+              <a:t>IndexOutOfBoundException</a:t>
+            </a:r>
+            <a:endParaRPr lang="pl-PL" dirty="0"/>
+          </a:p>
+        </p:txBody>
+      </p:sp>
+    </p:spTree>
+    <p:extLst>
+      <p:ext uri="{BB962C8B-B14F-4D97-AF65-F5344CB8AC3E}">
+        <p14:creationId xmlns:p14="http://schemas.microsoft.com/office/powerpoint/2010/main" val="4127743925"/>
+      </p:ext>
+    </p:extLst>
+  </p:cSld>
+  <p:clrMapOvr>
+    <a:masterClrMapping/>
+  </p:clrMapOvr>
+  <mc:AlternateContent xmlns:mc="http://schemas.openxmlformats.org/markup-compatibility/2006" xmlns:p14="http://schemas.microsoft.com/office/powerpoint/2010/main">
+    <mc:Choice Requires="p14">
+      <p:transition spd="med" p14:dur="700">
+        <p:fade/>
+      </p:transition>
+    </mc:Choice>
+    <mc:Fallback xmlns="">
+      <p:transition spd="med">
+        <p:fade/>
+      </p:transition>
+    </mc:Fallback>
+  </mc:AlternateContent>
+</p:sld>
+</file>
+
+<file path=ppt/slides/slide9.xml><?xml version="1.0" encoding="utf-8"?>
 <p:sld xmlns:a="http://schemas.openxmlformats.org/drawingml/2006/main" xmlns:r="http://schemas.openxmlformats.org/officeDocument/2006/relationships" xmlns:p="http://schemas.openxmlformats.org/presentationml/2006/main">
   <p:cSld>
     <p:spTree>

</xml_diff>